<commit_message>
Updated sample to .NET 6
</commit_message>
<xml_diff>
--- a/Presentation ASPNET - Part III.pptx
+++ b/Presentation ASPNET - Part III.pptx
@@ -307,7 +307,7 @@
           <a:p>
             <a:fld id="{CD54E0B9-A397-428E-BA01-CD7A34B572EB}" type="datetimeFigureOut">
               <a:rPr lang="en-US" smtClean="0"/>
-              <a:t>5/23/2021</a:t>
+              <a:t>5/14/2022</a:t>
             </a:fld>
             <a:endParaRPr lang="en-US"/>
           </a:p>
@@ -472,7 +472,7 @@
           <a:p>
             <a:fld id="{AA161301-18C9-4CA0-A0BF-791B6E0DDD4D}" type="datetimeFigureOut">
               <a:rPr lang="en-GB" smtClean="0"/>
-              <a:t>23/05/2021</a:t>
+              <a:t>14/05/2022</a:t>
             </a:fld>
             <a:endParaRPr lang="en-GB"/>
           </a:p>
@@ -11827,15 +11827,7 @@
             </a:r>
             <a:r>
               <a:rPr lang="en-US" b="1" dirty="0"/>
-              <a:t> </a:t>
-            </a:r>
-            <a:r>
-              <a:rPr lang="en-US" b="1"/>
-              <a:t>MVC Core 2 </a:t>
-            </a:r>
-            <a:r>
-              <a:rPr lang="en-US" b="1" dirty="0"/>
-              <a:t>– Part II</a:t>
+              <a:t> – Part III</a:t>
             </a:r>
             <a:endParaRPr lang="hr-HR" b="1" dirty="0">
               <a:effectLst>

</xml_diff>

<commit_message>
Update Presentation ASPNET - Part III.pptx
</commit_message>
<xml_diff>
--- a/Presentation ASPNET - Part III.pptx
+++ b/Presentation ASPNET - Part III.pptx
@@ -5,10 +5,10 @@
     <p:sldMasterId id="2147483648" r:id="rId1"/>
   </p:sldMasterIdLst>
   <p:notesMasterIdLst>
-    <p:notesMasterId r:id="rId34"/>
+    <p:notesMasterId r:id="rId36"/>
   </p:notesMasterIdLst>
   <p:handoutMasterIdLst>
-    <p:handoutMasterId r:id="rId35"/>
+    <p:handoutMasterId r:id="rId37"/>
   </p:handoutMasterIdLst>
   <p:sldIdLst>
     <p:sldId id="493" r:id="rId2"/>
@@ -40,9 +40,11 @@
     <p:sldId id="824" r:id="rId28"/>
     <p:sldId id="825" r:id="rId29"/>
     <p:sldId id="818" r:id="rId30"/>
-    <p:sldId id="790" r:id="rId31"/>
-    <p:sldId id="729" r:id="rId32"/>
-    <p:sldId id="827" r:id="rId33"/>
+    <p:sldId id="835" r:id="rId31"/>
+    <p:sldId id="790" r:id="rId32"/>
+    <p:sldId id="836" r:id="rId33"/>
+    <p:sldId id="729" r:id="rId34"/>
+    <p:sldId id="827" r:id="rId35"/>
   </p:sldIdLst>
   <p:sldSz cx="12192000" cy="6858000"/>
   <p:notesSz cx="9928225" cy="6797675"/>
@@ -195,7 +197,9 @@
         <p14:section name="Security – Other recommendations" id="{1AE92897-8E8C-4C87-AB55-D15B46B8C9BD}">
           <p14:sldIdLst>
             <p14:sldId id="818"/>
+            <p14:sldId id="835"/>
             <p14:sldId id="790"/>
+            <p14:sldId id="836"/>
           </p14:sldIdLst>
         </p14:section>
         <p14:section name="Thank you" id="{92E11870-417B-43C0-9450-C5636335B098}">
@@ -309,7 +313,7 @@
           <a:p>
             <a:fld id="{CD54E0B9-A397-428E-BA01-CD7A34B572EB}" type="datetimeFigureOut">
               <a:rPr lang="en-US" smtClean="0"/>
-              <a:t>2/24/2023</a:t>
+              <a:t>2/26/2023</a:t>
             </a:fld>
             <a:endParaRPr lang="en-US"/>
           </a:p>
@@ -474,7 +478,7 @@
           <a:p>
             <a:fld id="{AA161301-18C9-4CA0-A0BF-791B6E0DDD4D}" type="datetimeFigureOut">
               <a:rPr lang="en-GB" smtClean="0"/>
-              <a:t>24/02/2023</a:t>
+              <a:t>26/02/2023</a:t>
             </a:fld>
             <a:endParaRPr lang="en-GB"/>
           </a:p>
@@ -17602,7 +17606,41 @@
       </p:grpSpPr>
       <p:sp>
         <p:nvSpPr>
-          <p:cNvPr id="2" name="Title 1"/>
+          <p:cNvPr id="2" name="Content Placeholder 1">
+            <a:extLst>
+              <a:ext uri="{FF2B5EF4-FFF2-40B4-BE49-F238E27FC236}">
+                <a16:creationId xmlns:a16="http://schemas.microsoft.com/office/drawing/2014/main" id="{C5814789-9DE4-780A-7B72-48752BC843C2}"/>
+              </a:ext>
+            </a:extLst>
+          </p:cNvPr>
+          <p:cNvSpPr>
+            <a:spLocks noGrp="1"/>
+          </p:cNvSpPr>
+          <p:nvPr>
+            <p:ph idx="1"/>
+          </p:nvPr>
+        </p:nvSpPr>
+        <p:spPr/>
+        <p:txBody>
+          <a:bodyPr/>
+          <a:lstStyle/>
+          <a:p>
+            <a:r>
+              <a:rPr lang="ro-RO" dirty="0"/>
+              <a:t>https://learn.microsoft.com/en-us/aspnet/core/security/key-vault-configuration</a:t>
+            </a:r>
+          </a:p>
+        </p:txBody>
+      </p:sp>
+      <p:sp>
+        <p:nvSpPr>
+          <p:cNvPr id="3" name="Title 2">
+            <a:extLst>
+              <a:ext uri="{FF2B5EF4-FFF2-40B4-BE49-F238E27FC236}">
+                <a16:creationId xmlns:a16="http://schemas.microsoft.com/office/drawing/2014/main" id="{8A29587E-BF89-6E84-2693-335CDAB7FB0C}"/>
+              </a:ext>
+            </a:extLst>
+          </p:cNvPr>
           <p:cNvSpPr>
             <a:spLocks noGrp="1"/>
           </p:cNvSpPr>
@@ -17617,99 +17655,7 @@
           <a:p>
             <a:r>
               <a:rPr lang="en-US" dirty="0"/>
-              <a:t>General recommendations</a:t>
-            </a:r>
-            <a:endParaRPr lang="ro-RO" dirty="0"/>
-          </a:p>
-        </p:txBody>
-      </p:sp>
-      <p:sp>
-        <p:nvSpPr>
-          <p:cNvPr id="3" name="Content Placeholder 2"/>
-          <p:cNvSpPr>
-            <a:spLocks noGrp="1"/>
-          </p:cNvSpPr>
-          <p:nvPr>
-            <p:ph idx="1"/>
-          </p:nvPr>
-        </p:nvSpPr>
-        <p:spPr/>
-        <p:txBody>
-          <a:bodyPr/>
-          <a:lstStyle/>
-          <a:p>
-            <a:pPr>
-              <a:buFont typeface="Wingdings" pitchFamily="2" charset="2"/>
-              <a:buChar char="§"/>
-            </a:pPr>
-            <a:r>
-              <a:rPr lang="en-US" dirty="0"/>
-              <a:t>Only </a:t>
-            </a:r>
-            <a:r>
-              <a:rPr lang="en-US" b="1" dirty="0"/>
-              <a:t>Action</a:t>
-            </a:r>
-            <a:r>
-              <a:rPr lang="en-US" dirty="0"/>
-              <a:t> methods should be </a:t>
-            </a:r>
-            <a:r>
-              <a:rPr lang="en-US" b="1" dirty="0"/>
-              <a:t>public</a:t>
-            </a:r>
-            <a:r>
-              <a:rPr lang="en-US" dirty="0"/>
-              <a:t> in </a:t>
-            </a:r>
-            <a:r>
-              <a:rPr lang="en-US" b="1" dirty="0"/>
-              <a:t>controller</a:t>
-            </a:r>
-            <a:r>
-              <a:rPr lang="en-US" dirty="0"/>
-              <a:t> classes. The </a:t>
-            </a:r>
-            <a:r>
-              <a:rPr lang="en-US" b="1" dirty="0"/>
-              <a:t>[</a:t>
-            </a:r>
-            <a:r>
-              <a:rPr lang="en-US" b="1" dirty="0" err="1"/>
-              <a:t>NonAction</a:t>
-            </a:r>
-            <a:r>
-              <a:rPr lang="en-US" b="1" dirty="0"/>
-              <a:t>] </a:t>
-            </a:r>
-            <a:r>
-              <a:rPr lang="en-US" dirty="0"/>
-              <a:t>attribute can also be used to hide public methods.</a:t>
-            </a:r>
-          </a:p>
-          <a:p>
-            <a:pPr>
-              <a:buFont typeface="Wingdings" pitchFamily="2" charset="2"/>
-              <a:buChar char="§"/>
-            </a:pPr>
-            <a:endParaRPr lang="en-US" dirty="0"/>
-          </a:p>
-          <a:p>
-            <a:pPr>
-              <a:buFont typeface="Wingdings" pitchFamily="2" charset="2"/>
-              <a:buChar char="§"/>
-            </a:pPr>
-            <a:r>
-              <a:rPr lang="en-US" dirty="0"/>
-              <a:t>Implicit </a:t>
-            </a:r>
-            <a:r>
-              <a:rPr lang="en-US" b="1" dirty="0"/>
-              <a:t>model binding </a:t>
-            </a:r>
-            <a:r>
-              <a:rPr lang="en-US" dirty="0"/>
-              <a:t>can be used by attackers to modify unintended data.</a:t>
+              <a:t>Secrets storage</a:t>
             </a:r>
             <a:endParaRPr lang="ro-RO" dirty="0"/>
           </a:p>
@@ -17718,7 +17664,7 @@
     </p:spTree>
     <p:extLst>
       <p:ext uri="{BB962C8B-B14F-4D97-AF65-F5344CB8AC3E}">
-        <p14:creationId xmlns:p14="http://schemas.microsoft.com/office/powerpoint/2010/main" val="1891420182"/>
+        <p14:creationId xmlns:p14="http://schemas.microsoft.com/office/powerpoint/2010/main" val="1156671095"/>
       </p:ext>
     </p:extLst>
   </p:cSld>
@@ -17759,6 +17705,278 @@
       </p:grpSpPr>
       <p:sp>
         <p:nvSpPr>
+          <p:cNvPr id="2" name="Title 1"/>
+          <p:cNvSpPr>
+            <a:spLocks noGrp="1"/>
+          </p:cNvSpPr>
+          <p:nvPr>
+            <p:ph type="title"/>
+          </p:nvPr>
+        </p:nvSpPr>
+        <p:spPr/>
+        <p:txBody>
+          <a:bodyPr/>
+          <a:lstStyle/>
+          <a:p>
+            <a:r>
+              <a:rPr lang="en-US" dirty="0"/>
+              <a:t>General recommendations</a:t>
+            </a:r>
+            <a:endParaRPr lang="ro-RO" dirty="0"/>
+          </a:p>
+        </p:txBody>
+      </p:sp>
+      <p:sp>
+        <p:nvSpPr>
+          <p:cNvPr id="3" name="Content Placeholder 2"/>
+          <p:cNvSpPr>
+            <a:spLocks noGrp="1"/>
+          </p:cNvSpPr>
+          <p:nvPr>
+            <p:ph idx="1"/>
+          </p:nvPr>
+        </p:nvSpPr>
+        <p:spPr/>
+        <p:txBody>
+          <a:bodyPr/>
+          <a:lstStyle/>
+          <a:p>
+            <a:pPr>
+              <a:buFont typeface="Wingdings" pitchFamily="2" charset="2"/>
+              <a:buChar char="§"/>
+            </a:pPr>
+            <a:r>
+              <a:rPr lang="en-US" dirty="0"/>
+              <a:t>Only </a:t>
+            </a:r>
+            <a:r>
+              <a:rPr lang="en-US" b="1" dirty="0"/>
+              <a:t>Action</a:t>
+            </a:r>
+            <a:r>
+              <a:rPr lang="en-US" dirty="0"/>
+              <a:t> methods should be </a:t>
+            </a:r>
+            <a:r>
+              <a:rPr lang="en-US" b="1" dirty="0"/>
+              <a:t>public</a:t>
+            </a:r>
+            <a:r>
+              <a:rPr lang="en-US" dirty="0"/>
+              <a:t> in </a:t>
+            </a:r>
+            <a:r>
+              <a:rPr lang="en-US" b="1" dirty="0"/>
+              <a:t>controller</a:t>
+            </a:r>
+            <a:r>
+              <a:rPr lang="en-US" dirty="0"/>
+              <a:t> classes. The </a:t>
+            </a:r>
+            <a:r>
+              <a:rPr lang="en-US" b="1" dirty="0"/>
+              <a:t>[</a:t>
+            </a:r>
+            <a:r>
+              <a:rPr lang="en-US" b="1" dirty="0" err="1"/>
+              <a:t>NonAction</a:t>
+            </a:r>
+            <a:r>
+              <a:rPr lang="en-US" b="1" dirty="0"/>
+              <a:t>] </a:t>
+            </a:r>
+            <a:r>
+              <a:rPr lang="en-US" dirty="0"/>
+              <a:t>attribute can also be used to hide public methods.</a:t>
+            </a:r>
+          </a:p>
+          <a:p>
+            <a:pPr>
+              <a:buFont typeface="Wingdings" pitchFamily="2" charset="2"/>
+              <a:buChar char="§"/>
+            </a:pPr>
+            <a:endParaRPr lang="en-US" dirty="0"/>
+          </a:p>
+          <a:p>
+            <a:pPr>
+              <a:buFont typeface="Wingdings" pitchFamily="2" charset="2"/>
+              <a:buChar char="§"/>
+            </a:pPr>
+            <a:r>
+              <a:rPr lang="en-US" dirty="0"/>
+              <a:t>Implicit </a:t>
+            </a:r>
+            <a:r>
+              <a:rPr lang="en-US" b="1" dirty="0"/>
+              <a:t>model binding </a:t>
+            </a:r>
+            <a:r>
+              <a:rPr lang="en-US" dirty="0"/>
+              <a:t>can be used by attackers to modify unintended data.</a:t>
+            </a:r>
+            <a:endParaRPr lang="ro-RO" dirty="0"/>
+          </a:p>
+        </p:txBody>
+      </p:sp>
+    </p:spTree>
+    <p:extLst>
+      <p:ext uri="{BB962C8B-B14F-4D97-AF65-F5344CB8AC3E}">
+        <p14:creationId xmlns:p14="http://schemas.microsoft.com/office/powerpoint/2010/main" val="1891420182"/>
+      </p:ext>
+    </p:extLst>
+  </p:cSld>
+  <p:clrMapOvr>
+    <a:masterClrMapping/>
+  </p:clrMapOvr>
+  <mc:AlternateContent xmlns:mc="http://schemas.openxmlformats.org/markup-compatibility/2006" xmlns:p14="http://schemas.microsoft.com/office/powerpoint/2010/main">
+    <mc:Choice Requires="p14">
+      <p:transition spd="med" p14:dur="700">
+        <p:fade/>
+      </p:transition>
+    </mc:Choice>
+    <mc:Fallback xmlns="">
+      <p:transition spd="med">
+        <p:fade/>
+      </p:transition>
+    </mc:Fallback>
+  </mc:AlternateContent>
+</p:sld>
+</file>
+
+<file path=ppt/slides/slide32.xml><?xml version="1.0" encoding="utf-8"?>
+<p:sld xmlns:a="http://schemas.openxmlformats.org/drawingml/2006/main" xmlns:r="http://schemas.openxmlformats.org/officeDocument/2006/relationships" xmlns:p="http://schemas.openxmlformats.org/presentationml/2006/main">
+  <p:cSld>
+    <p:spTree>
+      <p:nvGrpSpPr>
+        <p:cNvPr id="1" name=""/>
+        <p:cNvGrpSpPr/>
+        <p:nvPr/>
+      </p:nvGrpSpPr>
+      <p:grpSpPr>
+        <a:xfrm>
+          <a:off x="0" y="0"/>
+          <a:ext cx="0" cy="0"/>
+          <a:chOff x="0" y="0"/>
+          <a:chExt cx="0" cy="0"/>
+        </a:xfrm>
+      </p:grpSpPr>
+      <p:sp>
+        <p:nvSpPr>
+          <p:cNvPr id="2" name="Content Placeholder 1">
+            <a:extLst>
+              <a:ext uri="{FF2B5EF4-FFF2-40B4-BE49-F238E27FC236}">
+                <a16:creationId xmlns:a16="http://schemas.microsoft.com/office/drawing/2014/main" id="{FE66EDE7-C397-D54C-A3A4-7B3EC41C8F13}"/>
+              </a:ext>
+            </a:extLst>
+          </p:cNvPr>
+          <p:cNvSpPr>
+            <a:spLocks noGrp="1"/>
+          </p:cNvSpPr>
+          <p:nvPr>
+            <p:ph idx="1"/>
+          </p:nvPr>
+        </p:nvSpPr>
+        <p:spPr/>
+        <p:txBody>
+          <a:bodyPr/>
+          <a:lstStyle/>
+          <a:p>
+            <a:r>
+              <a:rPr lang="ro-RO" dirty="0"/>
+              <a:t>https://learn.microsoft.com/en-us/aspnet/core/security/</a:t>
+            </a:r>
+            <a:endParaRPr lang="en-US" dirty="0"/>
+          </a:p>
+          <a:p>
+            <a:endParaRPr lang="en-US" dirty="0"/>
+          </a:p>
+          <a:p>
+            <a:endParaRPr lang="en-US" dirty="0"/>
+          </a:p>
+          <a:p>
+            <a:endParaRPr lang="en-US" dirty="0"/>
+          </a:p>
+          <a:p>
+            <a:r>
+              <a:rPr lang="ro-RO" dirty="0"/>
+              <a:t>https://owasp.org/www-project-top-ten/</a:t>
+            </a:r>
+          </a:p>
+        </p:txBody>
+      </p:sp>
+      <p:sp>
+        <p:nvSpPr>
+          <p:cNvPr id="3" name="Title 2">
+            <a:extLst>
+              <a:ext uri="{FF2B5EF4-FFF2-40B4-BE49-F238E27FC236}">
+                <a16:creationId xmlns:a16="http://schemas.microsoft.com/office/drawing/2014/main" id="{9D5520BD-A415-4576-F99F-711CECDA66A5}"/>
+              </a:ext>
+            </a:extLst>
+          </p:cNvPr>
+          <p:cNvSpPr>
+            <a:spLocks noGrp="1"/>
+          </p:cNvSpPr>
+          <p:nvPr>
+            <p:ph type="title"/>
+          </p:nvPr>
+        </p:nvSpPr>
+        <p:spPr/>
+        <p:txBody>
+          <a:bodyPr/>
+          <a:lstStyle/>
+          <a:p>
+            <a:r>
+              <a:rPr lang="en-US" dirty="0"/>
+              <a:t>Other recommendations</a:t>
+            </a:r>
+            <a:endParaRPr lang="ro-RO" dirty="0"/>
+          </a:p>
+        </p:txBody>
+      </p:sp>
+    </p:spTree>
+    <p:extLst>
+      <p:ext uri="{BB962C8B-B14F-4D97-AF65-F5344CB8AC3E}">
+        <p14:creationId xmlns:p14="http://schemas.microsoft.com/office/powerpoint/2010/main" val="2834329965"/>
+      </p:ext>
+    </p:extLst>
+  </p:cSld>
+  <p:clrMapOvr>
+    <a:masterClrMapping/>
+  </p:clrMapOvr>
+  <mc:AlternateContent xmlns:mc="http://schemas.openxmlformats.org/markup-compatibility/2006" xmlns:p14="http://schemas.microsoft.com/office/powerpoint/2010/main">
+    <mc:Choice Requires="p14">
+      <p:transition spd="med" p14:dur="700">
+        <p:fade/>
+      </p:transition>
+    </mc:Choice>
+    <mc:Fallback xmlns="">
+      <p:transition spd="med">
+        <p:fade/>
+      </p:transition>
+    </mc:Fallback>
+  </mc:AlternateContent>
+</p:sld>
+</file>
+
+<file path=ppt/slides/slide33.xml><?xml version="1.0" encoding="utf-8"?>
+<p:sld xmlns:a="http://schemas.openxmlformats.org/drawingml/2006/main" xmlns:r="http://schemas.openxmlformats.org/officeDocument/2006/relationships" xmlns:p="http://schemas.openxmlformats.org/presentationml/2006/main">
+  <p:cSld>
+    <p:spTree>
+      <p:nvGrpSpPr>
+        <p:cNvPr id="1" name=""/>
+        <p:cNvGrpSpPr/>
+        <p:nvPr/>
+      </p:nvGrpSpPr>
+      <p:grpSpPr>
+        <a:xfrm>
+          <a:off x="0" y="0"/>
+          <a:ext cx="0" cy="0"/>
+          <a:chOff x="0" y="0"/>
+          <a:chExt cx="0" cy="0"/>
+        </a:xfrm>
+      </p:grpSpPr>
+      <p:sp>
+        <p:nvSpPr>
           <p:cNvPr id="4" name="Title 3"/>
           <p:cNvSpPr>
             <a:spLocks noGrp="1"/>
@@ -17804,7 +18022,7 @@
 </p:sld>
 </file>
 
-<file path=ppt/slides/slide32.xml><?xml version="1.0" encoding="utf-8"?>
+<file path=ppt/slides/slide34.xml><?xml version="1.0" encoding="utf-8"?>
 <p:sld xmlns:a="http://schemas.openxmlformats.org/drawingml/2006/main" xmlns:r="http://schemas.openxmlformats.org/officeDocument/2006/relationships" xmlns:p="http://schemas.openxmlformats.org/presentationml/2006/main">
   <p:cSld>
     <p:spTree>

</xml_diff>